<commit_message>
ChessClock and manifest files
Uploaded a chess clock project and holy manifest files, Batman!
</commit_message>
<xml_diff>
--- a/doc/PowerPoints/Sprint 2  Term 2/Winter 2015 S2 Presentation.pptx
+++ b/doc/PowerPoints/Sprint 2  Term 2/Winter 2015 S2 Presentation.pptx
@@ -9,9 +9,10 @@
     <p:sldId id="257" r:id="rId3"/>
     <p:sldId id="259" r:id="rId4"/>
     <p:sldId id="258" r:id="rId5"/>
-    <p:sldId id="260" r:id="rId6"/>
-    <p:sldId id="261" r:id="rId7"/>
-    <p:sldId id="262" r:id="rId8"/>
+    <p:sldId id="263" r:id="rId6"/>
+    <p:sldId id="260" r:id="rId7"/>
+    <p:sldId id="261" r:id="rId8"/>
+    <p:sldId id="262" r:id="rId9"/>
   </p:sldIdLst>
   <p:sldSz cx="9144000" cy="6858000" type="screen4x3"/>
   <p:notesSz cx="6858000" cy="9144000"/>
@@ -330,7 +331,7 @@
             <a:fld id="{53074F12-AA26-4AC8-9962-C36BB8F32554}" type="datetimeFigureOut">
               <a:rPr lang="en-US" smtClean="0"/>
               <a:pPr/>
-              <a:t>2/15/2015</a:t>
+              <a:t>2/16/2015</a:t>
             </a:fld>
             <a:endParaRPr lang="en-US"/>
           </a:p>
@@ -585,7 +586,7 @@
             <a:fld id="{53074F12-AA26-4AC8-9962-C36BB8F32554}" type="datetimeFigureOut">
               <a:rPr lang="en-US" smtClean="0"/>
               <a:pPr/>
-              <a:t>2/15/2015</a:t>
+              <a:t>2/16/2015</a:t>
             </a:fld>
             <a:endParaRPr lang="en-US"/>
           </a:p>
@@ -757,7 +758,7 @@
             <a:fld id="{53074F12-AA26-4AC8-9962-C36BB8F32554}" type="datetimeFigureOut">
               <a:rPr lang="en-US" smtClean="0"/>
               <a:pPr/>
-              <a:t>2/15/2015</a:t>
+              <a:t>2/16/2015</a:t>
             </a:fld>
             <a:endParaRPr lang="en-US"/>
           </a:p>
@@ -939,7 +940,7 @@
             <a:fld id="{53074F12-AA26-4AC8-9962-C36BB8F32554}" type="datetimeFigureOut">
               <a:rPr lang="en-US" smtClean="0"/>
               <a:pPr/>
-              <a:t>2/15/2015</a:t>
+              <a:t>2/16/2015</a:t>
             </a:fld>
             <a:endParaRPr lang="en-US"/>
           </a:p>
@@ -1167,7 +1168,7 @@
             <a:fld id="{53074F12-AA26-4AC8-9962-C36BB8F32554}" type="datetimeFigureOut">
               <a:rPr lang="en-US" smtClean="0"/>
               <a:pPr/>
-              <a:t>2/15/2015</a:t>
+              <a:t>2/16/2015</a:t>
             </a:fld>
             <a:endParaRPr lang="en-US"/>
           </a:p>
@@ -1395,7 +1396,7 @@
             <a:fld id="{53074F12-AA26-4AC8-9962-C36BB8F32554}" type="datetimeFigureOut">
               <a:rPr lang="en-US" smtClean="0"/>
               <a:pPr/>
-              <a:t>2/15/2015</a:t>
+              <a:t>2/16/2015</a:t>
             </a:fld>
             <a:endParaRPr lang="en-US"/>
           </a:p>
@@ -1643,7 +1644,7 @@
             <a:fld id="{53074F12-AA26-4AC8-9962-C36BB8F32554}" type="datetimeFigureOut">
               <a:rPr lang="en-US" smtClean="0"/>
               <a:pPr/>
-              <a:t>2/15/2015</a:t>
+              <a:t>2/16/2015</a:t>
             </a:fld>
             <a:endParaRPr lang="en-US"/>
           </a:p>
@@ -1933,7 +1934,7 @@
             <a:fld id="{53074F12-AA26-4AC8-9962-C36BB8F32554}" type="datetimeFigureOut">
               <a:rPr lang="en-US" smtClean="0"/>
               <a:pPr/>
-              <a:t>2/15/2015</a:t>
+              <a:t>2/16/2015</a:t>
             </a:fld>
             <a:endParaRPr lang="en-US"/>
           </a:p>
@@ -2416,7 +2417,7 @@
             <a:fld id="{53074F12-AA26-4AC8-9962-C36BB8F32554}" type="datetimeFigureOut">
               <a:rPr lang="en-US" smtClean="0"/>
               <a:pPr/>
-              <a:t>2/15/2015</a:t>
+              <a:t>2/16/2015</a:t>
             </a:fld>
             <a:endParaRPr lang="en-US"/>
           </a:p>
@@ -2536,7 +2537,7 @@
             <a:fld id="{53074F12-AA26-4AC8-9962-C36BB8F32554}" type="datetimeFigureOut">
               <a:rPr lang="en-US" smtClean="0"/>
               <a:pPr/>
-              <a:t>2/15/2015</a:t>
+              <a:t>2/16/2015</a:t>
             </a:fld>
             <a:endParaRPr lang="en-US"/>
           </a:p>
@@ -2633,7 +2634,7 @@
             <a:fld id="{53074F12-AA26-4AC8-9962-C36BB8F32554}" type="datetimeFigureOut">
               <a:rPr lang="en-US" smtClean="0"/>
               <a:pPr/>
-              <a:t>2/15/2015</a:t>
+              <a:t>2/16/2015</a:t>
             </a:fld>
             <a:endParaRPr lang="en-US"/>
           </a:p>
@@ -2912,7 +2913,7 @@
             <a:fld id="{53074F12-AA26-4AC8-9962-C36BB8F32554}" type="datetimeFigureOut">
               <a:rPr lang="en-US" smtClean="0"/>
               <a:pPr/>
-              <a:t>2/15/2015</a:t>
+              <a:t>2/16/2015</a:t>
             </a:fld>
             <a:endParaRPr lang="en-US"/>
           </a:p>
@@ -3136,7 +3137,7 @@
             <a:fld id="{53074F12-AA26-4AC8-9962-C36BB8F32554}" type="datetimeFigureOut">
               <a:rPr lang="en-US" smtClean="0"/>
               <a:pPr/>
-              <a:t>2/15/2015</a:t>
+              <a:t>2/16/2015</a:t>
             </a:fld>
             <a:endParaRPr lang="en-US"/>
           </a:p>
@@ -3908,14 +3909,43 @@
           <a:p>
             <a:pPr algn="l"/>
             <a:r>
-              <a:rPr lang="en-US" smtClean="0"/>
+              <a:rPr lang="en-US" dirty="0" smtClean="0"/>
               <a:t>Code </a:t>
             </a:r>
             <a:r>
-              <a:rPr lang="en-US" smtClean="0"/>
+              <a:rPr lang="en-US" dirty="0" smtClean="0"/>
               <a:t>Review</a:t>
             </a:r>
             <a:endParaRPr lang="en-US" dirty="0"/>
+          </a:p>
+        </p:txBody>
+      </p:sp>
+      <p:sp>
+        <p:nvSpPr>
+          <p:cNvPr id="3" name="TextBox 2"/>
+          <p:cNvSpPr txBox="1"/>
+          <p:nvPr/>
+        </p:nvSpPr>
+        <p:spPr>
+          <a:xfrm>
+            <a:off x="448965" y="2360065"/>
+            <a:ext cx="8229600" cy="1938992"/>
+          </a:xfrm>
+          <a:prstGeom prst="rect">
+            <a:avLst/>
+          </a:prstGeom>
+          <a:noFill/>
+        </p:spPr>
+        <p:txBody>
+          <a:bodyPr wrap="square" rtlCol="0">
+            <a:spAutoFit/>
+          </a:bodyPr>
+          <a:lstStyle/>
+          <a:p>
+            <a:r>
+              <a:rPr lang="en-US" sz="6000" dirty="0"/>
+              <a:t>https://github.com/chessgames/play-zone.git</a:t>
+            </a:r>
           </a:p>
         </p:txBody>
       </p:sp>
@@ -3958,7 +3988,7 @@
       </p:grpSpPr>
       <p:sp>
         <p:nvSpPr>
-          <p:cNvPr id="2" name="Title 1"/>
+          <p:cNvPr id="4" name="Title 3"/>
           <p:cNvSpPr>
             <a:spLocks noGrp="1"/>
           </p:cNvSpPr>
@@ -3968,56 +3998,23 @@
         </p:nvSpPr>
         <p:spPr/>
         <p:txBody>
-          <a:bodyPr/>
-          <a:lstStyle/>
-          <a:p>
-            <a:pPr algn="l"/>
-            <a:r>
-              <a:rPr lang="en-US" dirty="0" smtClean="0"/>
-              <a:t>Plans for Next Sprint</a:t>
+          <a:bodyPr>
+            <a:normAutofit/>
+          </a:bodyPr>
+          <a:lstStyle/>
+          <a:p>
+            <a:r>
+              <a:rPr lang="en-US" dirty="0" smtClean="0"/>
+              <a:t>Demonstration of code</a:t>
             </a:r>
             <a:endParaRPr lang="en-US" dirty="0"/>
-          </a:p>
-        </p:txBody>
-      </p:sp>
-      <p:sp>
-        <p:nvSpPr>
-          <p:cNvPr id="3" name="Content Placeholder 2"/>
-          <p:cNvSpPr>
-            <a:spLocks noGrp="1"/>
-          </p:cNvSpPr>
-          <p:nvPr>
-            <p:ph idx="1"/>
-          </p:nvPr>
-        </p:nvSpPr>
-        <p:spPr/>
-        <p:txBody>
-          <a:bodyPr/>
-          <a:lstStyle/>
-          <a:p>
-            <a:r>
-              <a:rPr lang="en-US" dirty="0" smtClean="0"/>
-              <a:t>Move Validation</a:t>
-            </a:r>
-          </a:p>
-          <a:p>
-            <a:r>
-              <a:rPr lang="en-US" dirty="0" smtClean="0"/>
-              <a:t>Chess Clocks</a:t>
-            </a:r>
-          </a:p>
-          <a:p>
-            <a:r>
-              <a:rPr lang="en-US" dirty="0" smtClean="0"/>
-              <a:t>Algebraic Notation Display</a:t>
-            </a:r>
           </a:p>
         </p:txBody>
       </p:sp>
     </p:spTree>
     <p:extLst>
       <p:ext uri="{BB962C8B-B14F-4D97-AF65-F5344CB8AC3E}">
-        <p14:creationId xmlns:p14="http://schemas.microsoft.com/office/powerpoint/2010/main" val="3222293593"/>
+        <p14:creationId xmlns:p14="http://schemas.microsoft.com/office/powerpoint/2010/main" val="2437106423"/>
       </p:ext>
     </p:extLst>
   </p:cSld>
@@ -4069,6 +4066,101 @@
             <a:pPr algn="l"/>
             <a:r>
               <a:rPr lang="en-US" dirty="0" smtClean="0"/>
+              <a:t>Plans for Next Sprint</a:t>
+            </a:r>
+            <a:endParaRPr lang="en-US" dirty="0"/>
+          </a:p>
+        </p:txBody>
+      </p:sp>
+      <p:sp>
+        <p:nvSpPr>
+          <p:cNvPr id="3" name="Content Placeholder 2"/>
+          <p:cNvSpPr>
+            <a:spLocks noGrp="1"/>
+          </p:cNvSpPr>
+          <p:nvPr>
+            <p:ph idx="1"/>
+          </p:nvPr>
+        </p:nvSpPr>
+        <p:spPr/>
+        <p:txBody>
+          <a:bodyPr/>
+          <a:lstStyle/>
+          <a:p>
+            <a:r>
+              <a:rPr lang="en-US" dirty="0" smtClean="0"/>
+              <a:t>Move Validation</a:t>
+            </a:r>
+          </a:p>
+          <a:p>
+            <a:r>
+              <a:rPr lang="en-US" dirty="0" smtClean="0"/>
+              <a:t>Chess Clocks</a:t>
+            </a:r>
+          </a:p>
+          <a:p>
+            <a:r>
+              <a:rPr lang="en-US" dirty="0" smtClean="0"/>
+              <a:t>Algebraic Notation Display</a:t>
+            </a:r>
+          </a:p>
+        </p:txBody>
+      </p:sp>
+    </p:spTree>
+    <p:extLst>
+      <p:ext uri="{BB962C8B-B14F-4D97-AF65-F5344CB8AC3E}">
+        <p14:creationId xmlns:p14="http://schemas.microsoft.com/office/powerpoint/2010/main" val="3222293593"/>
+      </p:ext>
+    </p:extLst>
+  </p:cSld>
+  <p:clrMapOvr>
+    <a:masterClrMapping/>
+  </p:clrMapOvr>
+  <p:timing>
+    <p:tnLst>
+      <p:par>
+        <p:cTn id="1" dur="indefinite" restart="never" nodeType="tmRoot"/>
+      </p:par>
+    </p:tnLst>
+  </p:timing>
+</p:sld>
+</file>
+
+<file path=ppt/slides/slide7.xml><?xml version="1.0" encoding="utf-8"?>
+<p:sld xmlns:a="http://schemas.openxmlformats.org/drawingml/2006/main" xmlns:r="http://schemas.openxmlformats.org/officeDocument/2006/relationships" xmlns:p="http://schemas.openxmlformats.org/presentationml/2006/main">
+  <p:cSld>
+    <p:spTree>
+      <p:nvGrpSpPr>
+        <p:cNvPr id="1" name=""/>
+        <p:cNvGrpSpPr/>
+        <p:nvPr/>
+      </p:nvGrpSpPr>
+      <p:grpSpPr>
+        <a:xfrm>
+          <a:off x="0" y="0"/>
+          <a:ext cx="0" cy="0"/>
+          <a:chOff x="0" y="0"/>
+          <a:chExt cx="0" cy="0"/>
+        </a:xfrm>
+      </p:grpSpPr>
+      <p:sp>
+        <p:nvSpPr>
+          <p:cNvPr id="2" name="Title 1"/>
+          <p:cNvSpPr>
+            <a:spLocks noGrp="1"/>
+          </p:cNvSpPr>
+          <p:nvPr>
+            <p:ph type="title"/>
+          </p:nvPr>
+        </p:nvSpPr>
+        <p:spPr/>
+        <p:txBody>
+          <a:bodyPr/>
+          <a:lstStyle/>
+          <a:p>
+            <a:pPr algn="l"/>
+            <a:r>
+              <a:rPr lang="en-US" dirty="0" smtClean="0"/>
               <a:t>Q&amp;A</a:t>
             </a:r>
             <a:endParaRPr lang="en-US" dirty="0"/>
@@ -4090,6 +4182,10 @@
           <a:bodyPr/>
           <a:lstStyle/>
           <a:p>
+            <a:r>
+              <a:rPr lang="en-US" dirty="0" smtClean="0"/>
+              <a:t>…</a:t>
+            </a:r>
             <a:endParaRPr lang="en-US" dirty="0" smtClean="0"/>
           </a:p>
         </p:txBody>
@@ -4114,7 +4210,7 @@
 </p:sld>
 </file>
 
-<file path=ppt/slides/slide7.xml><?xml version="1.0" encoding="utf-8"?>
+<file path=ppt/slides/slide8.xml><?xml version="1.0" encoding="utf-8"?>
 <p:sld xmlns:a="http://schemas.openxmlformats.org/drawingml/2006/main" xmlns:r="http://schemas.openxmlformats.org/officeDocument/2006/relationships" xmlns:p="http://schemas.openxmlformats.org/presentationml/2006/main">
   <p:cSld>
     <p:spTree>

</xml_diff>